<commit_message>
Insert hyperlink in the last slide - Reference
</commit_message>
<xml_diff>
--- a/ProducerConsumer.pptx
+++ b/ProducerConsumer.pptx
@@ -22,16 +22,16 @@
   <p:notesSz cx="6858000" cy="9144000"/>
   <p:embeddedFontLst>
     <p:embeddedFont>
-      <p:font typeface="Tinos" charset="0"/>
+      <p:font typeface="Oswald" charset="0"/>
       <p:regular r:id="rId12"/>
       <p:bold r:id="rId13"/>
-      <p:italic r:id="rId14"/>
-      <p:boldItalic r:id="rId15"/>
     </p:embeddedFont>
     <p:embeddedFont>
-      <p:font typeface="Oswald" charset="0"/>
-      <p:regular r:id="rId16"/>
-      <p:bold r:id="rId17"/>
+      <p:font typeface="Tinos" charset="0"/>
+      <p:regular r:id="rId14"/>
+      <p:bold r:id="rId15"/>
+      <p:italic r:id="rId16"/>
+      <p:boldItalic r:id="rId17"/>
     </p:embeddedFont>
   </p:embeddedFontLst>
   <p:defaultTextStyle>
@@ -4514,7 +4514,6 @@
               <a:rPr lang="en" dirty="0"/>
               <a:t>Download images and show to UI for Youtube App</a:t>
             </a:r>
-            <a:endParaRPr lang="en" dirty="0"/>
           </a:p>
         </p:txBody>
       </p:sp>
@@ -5589,27 +5588,7 @@
                   </a:schemeClr>
                 </a:solidFill>
               </a:rPr>
-              <a:t>T</a:t>
-            </a:r>
-            <a:r>
-              <a:rPr lang="en" sz="1800" b="1" dirty="0" smtClean="0">
-                <a:solidFill>
-                  <a:schemeClr val="accent1">
-                    <a:lumMod val="75000"/>
-                  </a:schemeClr>
-                </a:solidFill>
-              </a:rPr>
-              <a:t>hanhVV8</a:t>
-            </a:r>
-            <a:r>
-              <a:rPr lang="en" sz="1800" b="1" dirty="0" smtClean="0">
-                <a:solidFill>
-                  <a:schemeClr val="accent1">
-                    <a:lumMod val="75000"/>
-                  </a:schemeClr>
-                </a:solidFill>
-              </a:rPr>
-              <a:t>@FPT.COM.VN</a:t>
+              <a:t>ThanhVV8@FPT.COM.VN</a:t>
             </a:r>
             <a:endParaRPr lang="en" sz="1800" b="1" dirty="0">
               <a:solidFill>
@@ -5723,18 +5702,16 @@
               </a:lnSpc>
             </a:pPr>
             <a:r>
-              <a:rPr lang="en-US" sz="2400" dirty="0" smtClean="0"/>
-              <a:t>http</a:t>
-            </a:r>
-            <a:r>
-              <a:rPr lang="en-US" sz="2400" dirty="0"/>
-              <a:t>://vichargrave.com/multithreaded-work-queue-in-c/</a:t>
+              <a:rPr lang="en-US" sz="2400" dirty="0">
+                <a:hlinkClick r:id="rId3"/>
+              </a:rPr>
+              <a:t>http://vichargrave.com/multithreaded-work-queue-in-c/</a:t>
             </a:r>
             <a:endParaRPr lang="en" sz="2400" u="sng" dirty="0">
               <a:solidFill>
                 <a:srgbClr val="25212A"/>
               </a:solidFill>
-              <a:hlinkClick r:id="rId3"/>
+              <a:hlinkClick r:id="rId4"/>
             </a:endParaRPr>
           </a:p>
           <a:p>
@@ -5744,14 +5721,16 @@
               </a:lnSpc>
             </a:pPr>
             <a:r>
-              <a:rPr lang="en-US" sz="2400" dirty="0"/>
+              <a:rPr lang="en-US" sz="2400" dirty="0">
+                <a:hlinkClick r:id="rId5"/>
+              </a:rPr>
               <a:t>http://www.cs.loyola.edu/~jglenn/702/S2008/Examples/ProducerConsumer/pc_cpp.html</a:t>
             </a:r>
             <a:endParaRPr lang="en" sz="2400" u="sng" dirty="0">
               <a:solidFill>
                 <a:srgbClr val="25212A"/>
               </a:solidFill>
-              <a:hlinkClick r:id="rId4"/>
+              <a:hlinkClick r:id="rId6"/>
             </a:endParaRPr>
           </a:p>
         </p:txBody>

</xml_diff>